<commit_message>
kendo ui web sushi example, entry beginner level materials,
</commit_message>
<xml_diff>
--- a/JsTraining-presentation/JS Training.pptx
+++ b/JsTraining-presentation/JS Training.pptx
@@ -234,7 +234,7 @@
           <a:p>
             <a:fld id="{09602215-4A9B-41A2-BE1E-32070F33B33D}" type="datetimeFigureOut">
               <a:rPr lang="pl-PL" smtClean="0"/>
-              <a:t>23.01.2018</a:t>
+              <a:t>27.02.2018</a:t>
             </a:fld>
             <a:endParaRPr lang="pl-PL"/>
           </a:p>
@@ -2555,7 +2555,7 @@
           <a:p>
             <a:fld id="{C57C09B5-6BF9-4018-AF21-4D72641C658B}" type="datetimeFigureOut">
               <a:rPr lang="pl-PL" smtClean="0"/>
-              <a:t>23.01.2018</a:t>
+              <a:t>27.02.2018</a:t>
             </a:fld>
             <a:endParaRPr lang="pl-PL"/>
           </a:p>
@@ -2853,7 +2853,7 @@
           <a:p>
             <a:fld id="{C57C09B5-6BF9-4018-AF21-4D72641C658B}" type="datetimeFigureOut">
               <a:rPr lang="pl-PL" smtClean="0"/>
-              <a:t>23.01.2018</a:t>
+              <a:t>27.02.2018</a:t>
             </a:fld>
             <a:endParaRPr lang="pl-PL"/>
           </a:p>
@@ -3004,7 +3004,7 @@
           <a:p>
             <a:fld id="{C57C09B5-6BF9-4018-AF21-4D72641C658B}" type="datetimeFigureOut">
               <a:rPr lang="pl-PL" smtClean="0"/>
-              <a:t>23.01.2018</a:t>
+              <a:t>27.02.2018</a:t>
             </a:fld>
             <a:endParaRPr lang="pl-PL"/>
           </a:p>
@@ -3306,7 +3306,7 @@
           <a:p>
             <a:fld id="{C57C09B5-6BF9-4018-AF21-4D72641C658B}" type="datetimeFigureOut">
               <a:rPr lang="pl-PL" smtClean="0"/>
-              <a:t>23.01.2018</a:t>
+              <a:t>27.02.2018</a:t>
             </a:fld>
             <a:endParaRPr lang="pl-PL"/>
           </a:p>
@@ -3596,7 +3596,7 @@
           <a:p>
             <a:fld id="{C57C09B5-6BF9-4018-AF21-4D72641C658B}" type="datetimeFigureOut">
               <a:rPr lang="pl-PL" smtClean="0"/>
-              <a:t>23.01.2018</a:t>
+              <a:t>27.02.2018</a:t>
             </a:fld>
             <a:endParaRPr lang="pl-PL"/>
           </a:p>
@@ -3703,7 +3703,7 @@
           <a:p>
             <a:fld id="{C57C09B5-6BF9-4018-AF21-4D72641C658B}" type="datetimeFigureOut">
               <a:rPr lang="pl-PL" smtClean="0"/>
-              <a:t>23.01.2018</a:t>
+              <a:t>27.02.2018</a:t>
             </a:fld>
             <a:endParaRPr lang="pl-PL"/>
           </a:p>
@@ -3823,7 +3823,7 @@
           <a:p>
             <a:fld id="{C57C09B5-6BF9-4018-AF21-4D72641C658B}" type="datetimeFigureOut">
               <a:rPr lang="pl-PL" smtClean="0"/>
-              <a:t>23.01.2018</a:t>
+              <a:t>27.02.2018</a:t>
             </a:fld>
             <a:endParaRPr lang="pl-PL"/>
           </a:p>
@@ -4104,7 +4104,7 @@
           <a:p>
             <a:fld id="{C57C09B5-6BF9-4018-AF21-4D72641C658B}" type="datetimeFigureOut">
               <a:rPr lang="pl-PL" smtClean="0"/>
-              <a:t>23.01.2018</a:t>
+              <a:t>27.02.2018</a:t>
             </a:fld>
             <a:endParaRPr lang="pl-PL"/>
           </a:p>
@@ -4368,7 +4368,7 @@
           <a:p>
             <a:fld id="{C57C09B5-6BF9-4018-AF21-4D72641C658B}" type="datetimeFigureOut">
               <a:rPr lang="pl-PL" smtClean="0"/>
-              <a:t>23.01.2018</a:t>
+              <a:t>27.02.2018</a:t>
             </a:fld>
             <a:endParaRPr lang="pl-PL"/>
           </a:p>
@@ -5283,7 +5283,7 @@
           <a:p>
             <a:fld id="{C57C09B5-6BF9-4018-AF21-4D72641C658B}" type="datetimeFigureOut">
               <a:rPr lang="pl-PL" smtClean="0"/>
-              <a:t>23.01.2018</a:t>
+              <a:t>27.02.2018</a:t>
             </a:fld>
             <a:endParaRPr lang="pl-PL"/>
           </a:p>
@@ -12385,7 +12385,7 @@
           <a:p>
             <a:r>
               <a:rPr lang="en-GB" sz="2400" dirty="0" err="1"/>
-              <a:t>.net</a:t>
+              <a:t>.Net</a:t>
             </a:r>
             <a:r>
               <a:rPr lang="en-GB" sz="2400" dirty="0"/>
@@ -12395,27 +12395,19 @@
           <a:p>
             <a:r>
               <a:rPr lang="en-GB" sz="2400" dirty="0"/>
-              <a:t>Expertise in Front-end technologies: JS, </a:t>
-            </a:r>
-            <a:r>
-              <a:rPr lang="en-GB" sz="2400" dirty="0" err="1"/>
-              <a:t>angularJS</a:t>
-            </a:r>
+              <a:t>Expertise in Front-end technologies: JS, AngularJS, Angular, CSS</a:t>
+            </a:r>
+          </a:p>
+          <a:p>
+            <a:endParaRPr lang="en-GB" sz="2400" dirty="0"/>
+          </a:p>
+          <a:p>
+            <a:endParaRPr lang="en-GB" sz="2400" dirty="0"/>
+          </a:p>
+          <a:p>
             <a:r>
               <a:rPr lang="en-GB" sz="2400" dirty="0"/>
-              <a:t>, CSS</a:t>
-            </a:r>
-          </a:p>
-          <a:p>
-            <a:endParaRPr lang="en-GB" sz="2400" dirty="0"/>
-          </a:p>
-          <a:p>
-            <a:endParaRPr lang="en-GB" sz="2400" dirty="0"/>
-          </a:p>
-          <a:p>
-            <a:r>
-              <a:rPr lang="en-GB" sz="2400" dirty="0"/>
-              <a:t>Current assignment Total Cost of Ownership for Volvo Penta </a:t>
+              <a:t>Current assignment TCO – Total Cost of Ownership for Volvo Penta </a:t>
             </a:r>
           </a:p>
           <a:p>
@@ -12424,18 +12416,8 @@
             </a:pPr>
             <a:r>
               <a:rPr lang="en-GB" sz="2400" dirty="0"/>
-              <a:t>Offline web app using Application Cache, AngularJS</a:t>
-            </a:r>
-          </a:p>
-          <a:p>
-            <a:pPr marL="457200" lvl="1" indent="0">
-              <a:buNone/>
-            </a:pPr>
-            <a:r>
-              <a:rPr lang="en-GB" sz="2400" dirty="0"/>
-              <a:t>The app estimates maintenance cost of Volvo Penta engines.</a:t>
-            </a:r>
-            <a:endParaRPr lang="pl-PL" sz="2400" dirty="0"/>
+              <a:t>Offline Web App in technologies:  AngularJS, Angular 5, Kendo.</a:t>
+            </a:r>
           </a:p>
         </p:txBody>
       </p:sp>
@@ -13766,20 +13748,16 @@
           <a:p>
             <a:r>
               <a:rPr lang="en-GB" sz="2400" dirty="0"/>
-              <a:t>Code + Presentation</a:t>
-            </a:r>
-            <a:r>
-              <a:rPr lang="en-GB" sz="2400"/>
-              <a:t>: </a:t>
-            </a:r>
-            <a:r>
-              <a:rPr lang="en-GB" sz="2400">
+              <a:t>Code + Presentation: </a:t>
+            </a:r>
+            <a:r>
+              <a:rPr lang="en-GB" sz="2400" dirty="0">
                 <a:hlinkClick r:id="rId2"/>
               </a:rPr>
               <a:t>https://github.com/dankrz/JsTraining</a:t>
             </a:r>
             <a:r>
-              <a:rPr lang="en-GB" sz="2400"/>
+              <a:rPr lang="en-GB" sz="2400" dirty="0"/>
               <a:t> </a:t>
             </a:r>
             <a:endParaRPr lang="en-GB" sz="2400" dirty="0">

</xml_diff>